<commit_message>
Updated employee management system presentation
</commit_message>
<xml_diff>
--- a/docs/employee-management-system.pptx
+++ b/docs/employee-management-system.pptx
@@ -268,7 +268,7 @@
           <a:p>
             <a:fld id="{B98924CC-0B0C-4517-9F72-E64E97373B52}" type="datetimeFigureOut">
               <a:rPr lang="hu-HU" smtClean="0"/>
-              <a:t>2025. 11. 02.</a:t>
+              <a:t>2025. 11. 03.</a:t>
             </a:fld>
             <a:endParaRPr lang="hu-HU"/>
           </a:p>
@@ -466,7 +466,7 @@
           <a:p>
             <a:fld id="{B98924CC-0B0C-4517-9F72-E64E97373B52}" type="datetimeFigureOut">
               <a:rPr lang="hu-HU" smtClean="0"/>
-              <a:t>2025. 11. 02.</a:t>
+              <a:t>2025. 11. 03.</a:t>
             </a:fld>
             <a:endParaRPr lang="hu-HU"/>
           </a:p>
@@ -674,7 +674,7 @@
           <a:p>
             <a:fld id="{B98924CC-0B0C-4517-9F72-E64E97373B52}" type="datetimeFigureOut">
               <a:rPr lang="hu-HU" smtClean="0"/>
-              <a:t>2025. 11. 02.</a:t>
+              <a:t>2025. 11. 03.</a:t>
             </a:fld>
             <a:endParaRPr lang="hu-HU"/>
           </a:p>
@@ -872,7 +872,7 @@
           <a:p>
             <a:fld id="{B98924CC-0B0C-4517-9F72-E64E97373B52}" type="datetimeFigureOut">
               <a:rPr lang="hu-HU" smtClean="0"/>
-              <a:t>2025. 11. 02.</a:t>
+              <a:t>2025. 11. 03.</a:t>
             </a:fld>
             <a:endParaRPr lang="hu-HU"/>
           </a:p>
@@ -1147,7 +1147,7 @@
           <a:p>
             <a:fld id="{B98924CC-0B0C-4517-9F72-E64E97373B52}" type="datetimeFigureOut">
               <a:rPr lang="hu-HU" smtClean="0"/>
-              <a:t>2025. 11. 02.</a:t>
+              <a:t>2025. 11. 03.</a:t>
             </a:fld>
             <a:endParaRPr lang="hu-HU"/>
           </a:p>
@@ -1412,7 +1412,7 @@
           <a:p>
             <a:fld id="{B98924CC-0B0C-4517-9F72-E64E97373B52}" type="datetimeFigureOut">
               <a:rPr lang="hu-HU" smtClean="0"/>
-              <a:t>2025. 11. 02.</a:t>
+              <a:t>2025. 11. 03.</a:t>
             </a:fld>
             <a:endParaRPr lang="hu-HU"/>
           </a:p>
@@ -1824,7 +1824,7 @@
           <a:p>
             <a:fld id="{B98924CC-0B0C-4517-9F72-E64E97373B52}" type="datetimeFigureOut">
               <a:rPr lang="hu-HU" smtClean="0"/>
-              <a:t>2025. 11. 02.</a:t>
+              <a:t>2025. 11. 03.</a:t>
             </a:fld>
             <a:endParaRPr lang="hu-HU"/>
           </a:p>
@@ -1965,7 +1965,7 @@
           <a:p>
             <a:fld id="{B98924CC-0B0C-4517-9F72-E64E97373B52}" type="datetimeFigureOut">
               <a:rPr lang="hu-HU" smtClean="0"/>
-              <a:t>2025. 11. 02.</a:t>
+              <a:t>2025. 11. 03.</a:t>
             </a:fld>
             <a:endParaRPr lang="hu-HU"/>
           </a:p>
@@ -2078,7 +2078,7 @@
           <a:p>
             <a:fld id="{B98924CC-0B0C-4517-9F72-E64E97373B52}" type="datetimeFigureOut">
               <a:rPr lang="hu-HU" smtClean="0"/>
-              <a:t>2025. 11. 02.</a:t>
+              <a:t>2025. 11. 03.</a:t>
             </a:fld>
             <a:endParaRPr lang="hu-HU"/>
           </a:p>
@@ -2389,7 +2389,7 @@
           <a:p>
             <a:fld id="{B98924CC-0B0C-4517-9F72-E64E97373B52}" type="datetimeFigureOut">
               <a:rPr lang="hu-HU" smtClean="0"/>
-              <a:t>2025. 11. 02.</a:t>
+              <a:t>2025. 11. 03.</a:t>
             </a:fld>
             <a:endParaRPr lang="hu-HU"/>
           </a:p>
@@ -2677,7 +2677,7 @@
           <a:p>
             <a:fld id="{B98924CC-0B0C-4517-9F72-E64E97373B52}" type="datetimeFigureOut">
               <a:rPr lang="hu-HU" smtClean="0"/>
-              <a:t>2025. 11. 02.</a:t>
+              <a:t>2025. 11. 03.</a:t>
             </a:fld>
             <a:endParaRPr lang="hu-HU"/>
           </a:p>
@@ -2918,7 +2918,7 @@
           <a:p>
             <a:fld id="{B98924CC-0B0C-4517-9F72-E64E97373B52}" type="datetimeFigureOut">
               <a:rPr lang="hu-HU" smtClean="0"/>
-              <a:t>2025. 11. 02.</a:t>
+              <a:t>2025. 11. 03.</a:t>
             </a:fld>
             <a:endParaRPr lang="hu-HU"/>
           </a:p>
@@ -3928,14 +3928,28 @@
                 <a:latin typeface="Times New Roman" panose="02020603050405020304" pitchFamily="18" charset="0"/>
                 <a:cs typeface="Times New Roman" panose="02020603050405020304" pitchFamily="18" charset="0"/>
               </a:rPr>
-              <a:t>Iterator</a:t>
+              <a:t>Factory</a:t>
             </a:r>
             <a:r>
               <a:rPr lang="hu-HU" sz="3300" dirty="0">
                 <a:latin typeface="Times New Roman" panose="02020603050405020304" pitchFamily="18" charset="0"/>
                 <a:cs typeface="Times New Roman" panose="02020603050405020304" pitchFamily="18" charset="0"/>
               </a:rPr>
-              <a:t> – dolgozók listájának bejárása </a:t>
+              <a:t> </a:t>
+            </a:r>
+            <a:r>
+              <a:rPr lang="hu-HU" sz="3300" dirty="0" err="1">
+                <a:latin typeface="Times New Roman" panose="02020603050405020304" pitchFamily="18" charset="0"/>
+                <a:cs typeface="Times New Roman" panose="02020603050405020304" pitchFamily="18" charset="0"/>
+              </a:rPr>
+              <a:t>Method</a:t>
+            </a:r>
+            <a:r>
+              <a:rPr lang="hu-HU" sz="3300" dirty="0">
+                <a:latin typeface="Times New Roman" panose="02020603050405020304" pitchFamily="18" charset="0"/>
+                <a:cs typeface="Times New Roman" panose="02020603050405020304" pitchFamily="18" charset="0"/>
+              </a:rPr>
+              <a:t> – dolgozók létrehozása (IT vagy egyetemi) </a:t>
             </a:r>
           </a:p>
           <a:p>
@@ -3949,28 +3963,14 @@
                 <a:latin typeface="Times New Roman" panose="02020603050405020304" pitchFamily="18" charset="0"/>
                 <a:cs typeface="Times New Roman" panose="02020603050405020304" pitchFamily="18" charset="0"/>
               </a:rPr>
-              <a:t>Factory</a:t>
+              <a:t>Iterator</a:t>
             </a:r>
             <a:r>
               <a:rPr lang="hu-HU" sz="3300" dirty="0">
                 <a:latin typeface="Times New Roman" panose="02020603050405020304" pitchFamily="18" charset="0"/>
                 <a:cs typeface="Times New Roman" panose="02020603050405020304" pitchFamily="18" charset="0"/>
               </a:rPr>
-              <a:t> </a:t>
-            </a:r>
-            <a:r>
-              <a:rPr lang="hu-HU" sz="3300" dirty="0" err="1">
-                <a:latin typeface="Times New Roman" panose="02020603050405020304" pitchFamily="18" charset="0"/>
-                <a:cs typeface="Times New Roman" panose="02020603050405020304" pitchFamily="18" charset="0"/>
-              </a:rPr>
-              <a:t>Method</a:t>
-            </a:r>
-            <a:r>
-              <a:rPr lang="hu-HU" sz="3300" dirty="0">
-                <a:latin typeface="Times New Roman" panose="02020603050405020304" pitchFamily="18" charset="0"/>
-                <a:cs typeface="Times New Roman" panose="02020603050405020304" pitchFamily="18" charset="0"/>
-              </a:rPr>
-              <a:t> – dolgozók létrehozása (IT vagy egyetemi) </a:t>
+              <a:t> – dolgozók listájának bejárása </a:t>
             </a:r>
           </a:p>
           <a:p>
@@ -4422,6 +4422,20 @@
                 <a:latin typeface="Times New Roman" panose="02020603050405020304" pitchFamily="18" charset="0"/>
                 <a:cs typeface="Times New Roman" panose="02020603050405020304" pitchFamily="18" charset="0"/>
               </a:rPr>
+              <a:t>getCurrentElement</a:t>
+            </a:r>
+            <a:r>
+              <a:rPr lang="hu-HU" sz="2500" dirty="0">
+                <a:latin typeface="Times New Roman" panose="02020603050405020304" pitchFamily="18" charset="0"/>
+                <a:cs typeface="Times New Roman" panose="02020603050405020304" pitchFamily="18" charset="0"/>
+              </a:rPr>
+              <a:t>(), </a:t>
+            </a:r>
+            <a:r>
+              <a:rPr lang="hu-HU" sz="2500" dirty="0" err="1">
+                <a:latin typeface="Times New Roman" panose="02020603050405020304" pitchFamily="18" charset="0"/>
+                <a:cs typeface="Times New Roman" panose="02020603050405020304" pitchFamily="18" charset="0"/>
+              </a:rPr>
               <a:t>getNextElement</a:t>
             </a:r>
             <a:r>
@@ -4464,10 +4478,10 @@
       </p:sp>
       <p:pic>
         <p:nvPicPr>
-          <p:cNvPr id="6" name="Kép 5">
-            <a:extLst>
-              <a:ext uri="{FF2B5EF4-FFF2-40B4-BE49-F238E27FC236}">
-                <a16:creationId xmlns:a16="http://schemas.microsoft.com/office/drawing/2014/main" id="{6085B10F-E76A-5759-FACC-38C85EB9BBAF}"/>
+          <p:cNvPr id="10" name="Kép 9">
+            <a:extLst>
+              <a:ext uri="{FF2B5EF4-FFF2-40B4-BE49-F238E27FC236}">
+                <a16:creationId xmlns:a16="http://schemas.microsoft.com/office/drawing/2014/main" id="{34889E4E-3FE1-FE37-83CE-B889782C293D}"/>
               </a:ext>
             </a:extLst>
           </p:cNvPr>
@@ -4484,8 +4498,8 @@
         </p:blipFill>
         <p:spPr>
           <a:xfrm>
-            <a:off x="5458968" y="1676400"/>
-            <a:ext cx="6583679" cy="4023359"/>
+            <a:off x="6025896" y="45012"/>
+            <a:ext cx="6166104" cy="6767976"/>
           </a:xfrm>
           <a:prstGeom prst="rect">
             <a:avLst/>

</xml_diff>